<commit_message>
MAJ Bug très vieux :)
</commit_message>
<xml_diff>
--- a/Chapitre_03_VitesseAcceleration/Cy_12_Ch_03_Application_01_Centrifugeuse/images/Figure.pptx
+++ b/Chapitre_03_VitesseAcceleration/Cy_12_Ch_03_Application_01_Centrifugeuse/images/Figure.pptx
@@ -108,6 +108,22 @@
       </a:defRPr>
     </a:lvl9pPr>
   </p:defaultTextStyle>
+  <p:extLst>
+    <p:ext uri="{EFAFB233-063F-42B5-8137-9DF3F51BA10A}">
+      <p15:sldGuideLst xmlns:p15="http://schemas.microsoft.com/office/powerpoint/2012/main">
+        <p15:guide id="1" orient="horz" pos="2160">
+          <p15:clr>
+            <a:srgbClr val="A4A3A4"/>
+          </p15:clr>
+        </p15:guide>
+        <p15:guide id="2" pos="2880">
+          <p15:clr>
+            <a:srgbClr val="A4A3A4"/>
+          </p15:clr>
+        </p15:guide>
+      </p15:sldGuideLst>
+    </p:ext>
+  </p:extLst>
 </p:presentation>
 </file>
 
@@ -194,7 +210,7 @@
             <a:fld id="{6667BA71-B846-4725-9733-44CF997FE375}" type="datetimeFigureOut">
               <a:rPr lang="fr-FR" smtClean="0"/>
               <a:pPr/>
-              <a:t>05/01/2015</a:t>
+              <a:t>07/11/2023</a:t>
             </a:fld>
             <a:endParaRPr lang="fr-FR"/>
           </a:p>
@@ -258,38 +274,37 @@
           <a:p>
             <a:pPr lvl="0"/>
             <a:r>
-              <a:rPr lang="fr-FR" smtClean="0"/>
+              <a:rPr lang="fr-FR"/>
               <a:t>Modifiez les styles du texte du masque</a:t>
             </a:r>
           </a:p>
           <a:p>
             <a:pPr lvl="1"/>
             <a:r>
-              <a:rPr lang="fr-FR" smtClean="0"/>
+              <a:rPr lang="fr-FR"/>
               <a:t>Deuxième niveau</a:t>
             </a:r>
           </a:p>
           <a:p>
             <a:pPr lvl="2"/>
             <a:r>
-              <a:rPr lang="fr-FR" smtClean="0"/>
+              <a:rPr lang="fr-FR"/>
               <a:t>Troisième niveau</a:t>
             </a:r>
           </a:p>
           <a:p>
             <a:pPr lvl="3"/>
             <a:r>
-              <a:rPr lang="fr-FR" smtClean="0"/>
+              <a:rPr lang="fr-FR"/>
               <a:t>Quatrième niveau</a:t>
             </a:r>
           </a:p>
           <a:p>
             <a:pPr lvl="4"/>
             <a:r>
-              <a:rPr lang="fr-FR" smtClean="0"/>
+              <a:rPr lang="fr-FR"/>
               <a:t>Cinquième niveau</a:t>
             </a:r>
-            <a:endParaRPr lang="fr-FR"/>
           </a:p>
         </p:txBody>
       </p:sp>
@@ -501,10 +516,9 @@
           <a:lstStyle/>
           <a:p>
             <a:r>
-              <a:rPr lang="fr-FR" smtClean="0"/>
+              <a:rPr lang="fr-FR"/>
               <a:t>Modifiez le style du titre</a:t>
             </a:r>
-            <a:endParaRPr lang="fr-FR"/>
           </a:p>
         </p:txBody>
       </p:sp>
@@ -620,10 +634,9 @@
           </a:lstStyle>
           <a:p>
             <a:r>
-              <a:rPr lang="fr-FR" smtClean="0"/>
+              <a:rPr lang="fr-FR"/>
               <a:t>Modifiez le style des sous-titres du masque</a:t>
             </a:r>
-            <a:endParaRPr lang="fr-FR"/>
           </a:p>
         </p:txBody>
       </p:sp>
@@ -645,7 +658,7 @@
             <a:fld id="{CEE667AA-1165-4D19-A520-0AAEBAFEBFEE}" type="datetimeFigureOut">
               <a:rPr lang="fr-FR" smtClean="0"/>
               <a:pPr/>
-              <a:t>05/01/2015</a:t>
+              <a:t>07/11/2023</a:t>
             </a:fld>
             <a:endParaRPr lang="fr-FR"/>
           </a:p>
@@ -740,10 +753,9 @@
           <a:lstStyle/>
           <a:p>
             <a:r>
-              <a:rPr lang="fr-FR" smtClean="0"/>
+              <a:rPr lang="fr-FR"/>
               <a:t>Modifiez le style du titre</a:t>
             </a:r>
-            <a:endParaRPr lang="fr-FR"/>
           </a:p>
         </p:txBody>
       </p:sp>
@@ -764,38 +776,37 @@
           <a:p>
             <a:pPr lvl="0"/>
             <a:r>
-              <a:rPr lang="fr-FR" smtClean="0"/>
+              <a:rPr lang="fr-FR"/>
               <a:t>Modifiez les styles du texte du masque</a:t>
             </a:r>
           </a:p>
           <a:p>
             <a:pPr lvl="1"/>
             <a:r>
-              <a:rPr lang="fr-FR" smtClean="0"/>
+              <a:rPr lang="fr-FR"/>
               <a:t>Deuxième niveau</a:t>
             </a:r>
           </a:p>
           <a:p>
             <a:pPr lvl="2"/>
             <a:r>
-              <a:rPr lang="fr-FR" smtClean="0"/>
+              <a:rPr lang="fr-FR"/>
               <a:t>Troisième niveau</a:t>
             </a:r>
           </a:p>
           <a:p>
             <a:pPr lvl="3"/>
             <a:r>
-              <a:rPr lang="fr-FR" smtClean="0"/>
+              <a:rPr lang="fr-FR"/>
               <a:t>Quatrième niveau</a:t>
             </a:r>
           </a:p>
           <a:p>
             <a:pPr lvl="4"/>
             <a:r>
-              <a:rPr lang="fr-FR" smtClean="0"/>
+              <a:rPr lang="fr-FR"/>
               <a:t>Cinquième niveau</a:t>
             </a:r>
-            <a:endParaRPr lang="fr-FR"/>
           </a:p>
         </p:txBody>
       </p:sp>
@@ -817,7 +828,7 @@
             <a:fld id="{CEE667AA-1165-4D19-A520-0AAEBAFEBFEE}" type="datetimeFigureOut">
               <a:rPr lang="fr-FR" smtClean="0"/>
               <a:pPr/>
-              <a:t>05/01/2015</a:t>
+              <a:t>07/11/2023</a:t>
             </a:fld>
             <a:endParaRPr lang="fr-FR"/>
           </a:p>
@@ -917,10 +928,9 @@
           <a:lstStyle/>
           <a:p>
             <a:r>
-              <a:rPr lang="fr-FR" smtClean="0"/>
+              <a:rPr lang="fr-FR"/>
               <a:t>Modifiez le style du titre</a:t>
             </a:r>
-            <a:endParaRPr lang="fr-FR"/>
           </a:p>
         </p:txBody>
       </p:sp>
@@ -946,38 +956,37 @@
           <a:p>
             <a:pPr lvl="0"/>
             <a:r>
-              <a:rPr lang="fr-FR" smtClean="0"/>
+              <a:rPr lang="fr-FR"/>
               <a:t>Modifiez les styles du texte du masque</a:t>
             </a:r>
           </a:p>
           <a:p>
             <a:pPr lvl="1"/>
             <a:r>
-              <a:rPr lang="fr-FR" smtClean="0"/>
+              <a:rPr lang="fr-FR"/>
               <a:t>Deuxième niveau</a:t>
             </a:r>
           </a:p>
           <a:p>
             <a:pPr lvl="2"/>
             <a:r>
-              <a:rPr lang="fr-FR" smtClean="0"/>
+              <a:rPr lang="fr-FR"/>
               <a:t>Troisième niveau</a:t>
             </a:r>
           </a:p>
           <a:p>
             <a:pPr lvl="3"/>
             <a:r>
-              <a:rPr lang="fr-FR" smtClean="0"/>
+              <a:rPr lang="fr-FR"/>
               <a:t>Quatrième niveau</a:t>
             </a:r>
           </a:p>
           <a:p>
             <a:pPr lvl="4"/>
             <a:r>
-              <a:rPr lang="fr-FR" smtClean="0"/>
+              <a:rPr lang="fr-FR"/>
               <a:t>Cinquième niveau</a:t>
             </a:r>
-            <a:endParaRPr lang="fr-FR"/>
           </a:p>
         </p:txBody>
       </p:sp>
@@ -999,7 +1008,7 @@
             <a:fld id="{CEE667AA-1165-4D19-A520-0AAEBAFEBFEE}" type="datetimeFigureOut">
               <a:rPr lang="fr-FR" smtClean="0"/>
               <a:pPr/>
-              <a:t>05/01/2015</a:t>
+              <a:t>07/11/2023</a:t>
             </a:fld>
             <a:endParaRPr lang="fr-FR"/>
           </a:p>
@@ -1094,10 +1103,9 @@
           <a:lstStyle/>
           <a:p>
             <a:r>
-              <a:rPr lang="fr-FR" smtClean="0"/>
+              <a:rPr lang="fr-FR"/>
               <a:t>Modifiez le style du titre</a:t>
             </a:r>
-            <a:endParaRPr lang="fr-FR"/>
           </a:p>
         </p:txBody>
       </p:sp>
@@ -1118,38 +1126,37 @@
           <a:p>
             <a:pPr lvl="0"/>
             <a:r>
-              <a:rPr lang="fr-FR" smtClean="0"/>
+              <a:rPr lang="fr-FR"/>
               <a:t>Modifiez les styles du texte du masque</a:t>
             </a:r>
           </a:p>
           <a:p>
             <a:pPr lvl="1"/>
             <a:r>
-              <a:rPr lang="fr-FR" smtClean="0"/>
+              <a:rPr lang="fr-FR"/>
               <a:t>Deuxième niveau</a:t>
             </a:r>
           </a:p>
           <a:p>
             <a:pPr lvl="2"/>
             <a:r>
-              <a:rPr lang="fr-FR" smtClean="0"/>
+              <a:rPr lang="fr-FR"/>
               <a:t>Troisième niveau</a:t>
             </a:r>
           </a:p>
           <a:p>
             <a:pPr lvl="3"/>
             <a:r>
-              <a:rPr lang="fr-FR" smtClean="0"/>
+              <a:rPr lang="fr-FR"/>
               <a:t>Quatrième niveau</a:t>
             </a:r>
           </a:p>
           <a:p>
             <a:pPr lvl="4"/>
             <a:r>
-              <a:rPr lang="fr-FR" smtClean="0"/>
+              <a:rPr lang="fr-FR"/>
               <a:t>Cinquième niveau</a:t>
             </a:r>
-            <a:endParaRPr lang="fr-FR"/>
           </a:p>
         </p:txBody>
       </p:sp>
@@ -1171,7 +1178,7 @@
             <a:fld id="{CEE667AA-1165-4D19-A520-0AAEBAFEBFEE}" type="datetimeFigureOut">
               <a:rPr lang="fr-FR" smtClean="0"/>
               <a:pPr/>
-              <a:t>05/01/2015</a:t>
+              <a:t>07/11/2023</a:t>
             </a:fld>
             <a:endParaRPr lang="fr-FR"/>
           </a:p>
@@ -1275,10 +1282,9 @@
           </a:lstStyle>
           <a:p>
             <a:r>
-              <a:rPr lang="fr-FR" smtClean="0"/>
+              <a:rPr lang="fr-FR"/>
               <a:t>Modifiez le style du titre</a:t>
             </a:r>
-            <a:endParaRPr lang="fr-FR"/>
           </a:p>
         </p:txBody>
       </p:sp>
@@ -1395,7 +1401,7 @@
           <a:p>
             <a:pPr lvl="0"/>
             <a:r>
-              <a:rPr lang="fr-FR" smtClean="0"/>
+              <a:rPr lang="fr-FR"/>
               <a:t>Modifiez les styles du texte du masque</a:t>
             </a:r>
           </a:p>
@@ -1419,7 +1425,7 @@
             <a:fld id="{CEE667AA-1165-4D19-A520-0AAEBAFEBFEE}" type="datetimeFigureOut">
               <a:rPr lang="fr-FR" smtClean="0"/>
               <a:pPr/>
-              <a:t>05/01/2015</a:t>
+              <a:t>07/11/2023</a:t>
             </a:fld>
             <a:endParaRPr lang="fr-FR"/>
           </a:p>
@@ -1514,10 +1520,9 @@
           <a:lstStyle/>
           <a:p>
             <a:r>
-              <a:rPr lang="fr-FR" smtClean="0"/>
+              <a:rPr lang="fr-FR"/>
               <a:t>Modifiez le style du titre</a:t>
             </a:r>
-            <a:endParaRPr lang="fr-FR"/>
           </a:p>
         </p:txBody>
       </p:sp>
@@ -1571,38 +1576,37 @@
           <a:p>
             <a:pPr lvl="0"/>
             <a:r>
-              <a:rPr lang="fr-FR" smtClean="0"/>
+              <a:rPr lang="fr-FR"/>
               <a:t>Modifiez les styles du texte du masque</a:t>
             </a:r>
           </a:p>
           <a:p>
             <a:pPr lvl="1"/>
             <a:r>
-              <a:rPr lang="fr-FR" smtClean="0"/>
+              <a:rPr lang="fr-FR"/>
               <a:t>Deuxième niveau</a:t>
             </a:r>
           </a:p>
           <a:p>
             <a:pPr lvl="2"/>
             <a:r>
-              <a:rPr lang="fr-FR" smtClean="0"/>
+              <a:rPr lang="fr-FR"/>
               <a:t>Troisième niveau</a:t>
             </a:r>
           </a:p>
           <a:p>
             <a:pPr lvl="3"/>
             <a:r>
-              <a:rPr lang="fr-FR" smtClean="0"/>
+              <a:rPr lang="fr-FR"/>
               <a:t>Quatrième niveau</a:t>
             </a:r>
           </a:p>
           <a:p>
             <a:pPr lvl="4"/>
             <a:r>
-              <a:rPr lang="fr-FR" smtClean="0"/>
+              <a:rPr lang="fr-FR"/>
               <a:t>Cinquième niveau</a:t>
             </a:r>
-            <a:endParaRPr lang="fr-FR"/>
           </a:p>
         </p:txBody>
       </p:sp>
@@ -1656,38 +1660,37 @@
           <a:p>
             <a:pPr lvl="0"/>
             <a:r>
-              <a:rPr lang="fr-FR" smtClean="0"/>
+              <a:rPr lang="fr-FR"/>
               <a:t>Modifiez les styles du texte du masque</a:t>
             </a:r>
           </a:p>
           <a:p>
             <a:pPr lvl="1"/>
             <a:r>
-              <a:rPr lang="fr-FR" smtClean="0"/>
+              <a:rPr lang="fr-FR"/>
               <a:t>Deuxième niveau</a:t>
             </a:r>
           </a:p>
           <a:p>
             <a:pPr lvl="2"/>
             <a:r>
-              <a:rPr lang="fr-FR" smtClean="0"/>
+              <a:rPr lang="fr-FR"/>
               <a:t>Troisième niveau</a:t>
             </a:r>
           </a:p>
           <a:p>
             <a:pPr lvl="3"/>
             <a:r>
-              <a:rPr lang="fr-FR" smtClean="0"/>
+              <a:rPr lang="fr-FR"/>
               <a:t>Quatrième niveau</a:t>
             </a:r>
           </a:p>
           <a:p>
             <a:pPr lvl="4"/>
             <a:r>
-              <a:rPr lang="fr-FR" smtClean="0"/>
+              <a:rPr lang="fr-FR"/>
               <a:t>Cinquième niveau</a:t>
             </a:r>
-            <a:endParaRPr lang="fr-FR"/>
           </a:p>
         </p:txBody>
       </p:sp>
@@ -1709,7 +1712,7 @@
             <a:fld id="{CEE667AA-1165-4D19-A520-0AAEBAFEBFEE}" type="datetimeFigureOut">
               <a:rPr lang="fr-FR" smtClean="0"/>
               <a:pPr/>
-              <a:t>05/01/2015</a:t>
+              <a:t>07/11/2023</a:t>
             </a:fld>
             <a:endParaRPr lang="fr-FR"/>
           </a:p>
@@ -1808,10 +1811,9 @@
           </a:lstStyle>
           <a:p>
             <a:r>
-              <a:rPr lang="fr-FR" smtClean="0"/>
+              <a:rPr lang="fr-FR"/>
               <a:t>Modifiez le style du titre</a:t>
             </a:r>
-            <a:endParaRPr lang="fr-FR"/>
           </a:p>
         </p:txBody>
       </p:sp>
@@ -1874,7 +1876,7 @@
           <a:p>
             <a:pPr lvl="0"/>
             <a:r>
-              <a:rPr lang="fr-FR" smtClean="0"/>
+              <a:rPr lang="fr-FR"/>
               <a:t>Modifiez les styles du texte du masque</a:t>
             </a:r>
           </a:p>
@@ -1930,38 +1932,37 @@
           <a:p>
             <a:pPr lvl="0"/>
             <a:r>
-              <a:rPr lang="fr-FR" smtClean="0"/>
+              <a:rPr lang="fr-FR"/>
               <a:t>Modifiez les styles du texte du masque</a:t>
             </a:r>
           </a:p>
           <a:p>
             <a:pPr lvl="1"/>
             <a:r>
-              <a:rPr lang="fr-FR" smtClean="0"/>
+              <a:rPr lang="fr-FR"/>
               <a:t>Deuxième niveau</a:t>
             </a:r>
           </a:p>
           <a:p>
             <a:pPr lvl="2"/>
             <a:r>
-              <a:rPr lang="fr-FR" smtClean="0"/>
+              <a:rPr lang="fr-FR"/>
               <a:t>Troisième niveau</a:t>
             </a:r>
           </a:p>
           <a:p>
             <a:pPr lvl="3"/>
             <a:r>
-              <a:rPr lang="fr-FR" smtClean="0"/>
+              <a:rPr lang="fr-FR"/>
               <a:t>Quatrième niveau</a:t>
             </a:r>
           </a:p>
           <a:p>
             <a:pPr lvl="4"/>
             <a:r>
-              <a:rPr lang="fr-FR" smtClean="0"/>
+              <a:rPr lang="fr-FR"/>
               <a:t>Cinquième niveau</a:t>
             </a:r>
-            <a:endParaRPr lang="fr-FR"/>
           </a:p>
         </p:txBody>
       </p:sp>
@@ -2024,7 +2025,7 @@
           <a:p>
             <a:pPr lvl="0"/>
             <a:r>
-              <a:rPr lang="fr-FR" smtClean="0"/>
+              <a:rPr lang="fr-FR"/>
               <a:t>Modifiez les styles du texte du masque</a:t>
             </a:r>
           </a:p>
@@ -2080,38 +2081,37 @@
           <a:p>
             <a:pPr lvl="0"/>
             <a:r>
-              <a:rPr lang="fr-FR" smtClean="0"/>
+              <a:rPr lang="fr-FR"/>
               <a:t>Modifiez les styles du texte du masque</a:t>
             </a:r>
           </a:p>
           <a:p>
             <a:pPr lvl="1"/>
             <a:r>
-              <a:rPr lang="fr-FR" smtClean="0"/>
+              <a:rPr lang="fr-FR"/>
               <a:t>Deuxième niveau</a:t>
             </a:r>
           </a:p>
           <a:p>
             <a:pPr lvl="2"/>
             <a:r>
-              <a:rPr lang="fr-FR" smtClean="0"/>
+              <a:rPr lang="fr-FR"/>
               <a:t>Troisième niveau</a:t>
             </a:r>
           </a:p>
           <a:p>
             <a:pPr lvl="3"/>
             <a:r>
-              <a:rPr lang="fr-FR" smtClean="0"/>
+              <a:rPr lang="fr-FR"/>
               <a:t>Quatrième niveau</a:t>
             </a:r>
           </a:p>
           <a:p>
             <a:pPr lvl="4"/>
             <a:r>
-              <a:rPr lang="fr-FR" smtClean="0"/>
+              <a:rPr lang="fr-FR"/>
               <a:t>Cinquième niveau</a:t>
             </a:r>
-            <a:endParaRPr lang="fr-FR"/>
           </a:p>
         </p:txBody>
       </p:sp>
@@ -2133,7 +2133,7 @@
             <a:fld id="{CEE667AA-1165-4D19-A520-0AAEBAFEBFEE}" type="datetimeFigureOut">
               <a:rPr lang="fr-FR" smtClean="0"/>
               <a:pPr/>
-              <a:t>05/01/2015</a:t>
+              <a:t>07/11/2023</a:t>
             </a:fld>
             <a:endParaRPr lang="fr-FR"/>
           </a:p>
@@ -2228,10 +2228,9 @@
           <a:lstStyle/>
           <a:p>
             <a:r>
-              <a:rPr lang="fr-FR" smtClean="0"/>
+              <a:rPr lang="fr-FR"/>
               <a:t>Modifiez le style du titre</a:t>
             </a:r>
-            <a:endParaRPr lang="fr-FR"/>
           </a:p>
         </p:txBody>
       </p:sp>
@@ -2253,7 +2252,7 @@
             <a:fld id="{CEE667AA-1165-4D19-A520-0AAEBAFEBFEE}" type="datetimeFigureOut">
               <a:rPr lang="fr-FR" smtClean="0"/>
               <a:pPr/>
-              <a:t>05/01/2015</a:t>
+              <a:t>07/11/2023</a:t>
             </a:fld>
             <a:endParaRPr lang="fr-FR"/>
           </a:p>
@@ -2350,7 +2349,7 @@
             <a:fld id="{CEE667AA-1165-4D19-A520-0AAEBAFEBFEE}" type="datetimeFigureOut">
               <a:rPr lang="fr-FR" smtClean="0"/>
               <a:pPr/>
-              <a:t>05/01/2015</a:t>
+              <a:t>07/11/2023</a:t>
             </a:fld>
             <a:endParaRPr lang="fr-FR"/>
           </a:p>
@@ -2454,10 +2453,9 @@
           </a:lstStyle>
           <a:p>
             <a:r>
-              <a:rPr lang="fr-FR" smtClean="0"/>
+              <a:rPr lang="fr-FR"/>
               <a:t>Modifiez le style du titre</a:t>
             </a:r>
-            <a:endParaRPr lang="fr-FR"/>
           </a:p>
         </p:txBody>
       </p:sp>
@@ -2511,38 +2509,37 @@
           <a:p>
             <a:pPr lvl="0"/>
             <a:r>
-              <a:rPr lang="fr-FR" smtClean="0"/>
+              <a:rPr lang="fr-FR"/>
               <a:t>Modifiez les styles du texte du masque</a:t>
             </a:r>
           </a:p>
           <a:p>
             <a:pPr lvl="1"/>
             <a:r>
-              <a:rPr lang="fr-FR" smtClean="0"/>
+              <a:rPr lang="fr-FR"/>
               <a:t>Deuxième niveau</a:t>
             </a:r>
           </a:p>
           <a:p>
             <a:pPr lvl="2"/>
             <a:r>
-              <a:rPr lang="fr-FR" smtClean="0"/>
+              <a:rPr lang="fr-FR"/>
               <a:t>Troisième niveau</a:t>
             </a:r>
           </a:p>
           <a:p>
             <a:pPr lvl="3"/>
             <a:r>
-              <a:rPr lang="fr-FR" smtClean="0"/>
+              <a:rPr lang="fr-FR"/>
               <a:t>Quatrième niveau</a:t>
             </a:r>
           </a:p>
           <a:p>
             <a:pPr lvl="4"/>
             <a:r>
-              <a:rPr lang="fr-FR" smtClean="0"/>
+              <a:rPr lang="fr-FR"/>
               <a:t>Cinquième niveau</a:t>
             </a:r>
-            <a:endParaRPr lang="fr-FR"/>
           </a:p>
         </p:txBody>
       </p:sp>
@@ -2605,7 +2602,7 @@
           <a:p>
             <a:pPr lvl="0"/>
             <a:r>
-              <a:rPr lang="fr-FR" smtClean="0"/>
+              <a:rPr lang="fr-FR"/>
               <a:t>Modifiez les styles du texte du masque</a:t>
             </a:r>
           </a:p>
@@ -2629,7 +2626,7 @@
             <a:fld id="{CEE667AA-1165-4D19-A520-0AAEBAFEBFEE}" type="datetimeFigureOut">
               <a:rPr lang="fr-FR" smtClean="0"/>
               <a:pPr/>
-              <a:t>05/01/2015</a:t>
+              <a:t>07/11/2023</a:t>
             </a:fld>
             <a:endParaRPr lang="fr-FR"/>
           </a:p>
@@ -2733,10 +2730,9 @@
           </a:lstStyle>
           <a:p>
             <a:r>
-              <a:rPr lang="fr-FR" smtClean="0"/>
+              <a:rPr lang="fr-FR"/>
               <a:t>Modifiez le style du titre</a:t>
             </a:r>
-            <a:endParaRPr lang="fr-FR"/>
           </a:p>
         </p:txBody>
       </p:sp>
@@ -2860,7 +2856,7 @@
           <a:p>
             <a:pPr lvl="0"/>
             <a:r>
-              <a:rPr lang="fr-FR" smtClean="0"/>
+              <a:rPr lang="fr-FR"/>
               <a:t>Modifiez les styles du texte du masque</a:t>
             </a:r>
           </a:p>
@@ -2884,7 +2880,7 @@
             <a:fld id="{CEE667AA-1165-4D19-A520-0AAEBAFEBFEE}" type="datetimeFigureOut">
               <a:rPr lang="fr-FR" smtClean="0"/>
               <a:pPr/>
-              <a:t>05/01/2015</a:t>
+              <a:t>07/11/2023</a:t>
             </a:fld>
             <a:endParaRPr lang="fr-FR"/>
           </a:p>
@@ -2994,10 +2990,9 @@
           <a:lstStyle/>
           <a:p>
             <a:r>
-              <a:rPr lang="fr-FR" smtClean="0"/>
+              <a:rPr lang="fr-FR"/>
               <a:t>Modifiez le style du titre</a:t>
             </a:r>
-            <a:endParaRPr lang="fr-FR"/>
           </a:p>
         </p:txBody>
       </p:sp>
@@ -3028,38 +3023,37 @@
           <a:p>
             <a:pPr lvl="0"/>
             <a:r>
-              <a:rPr lang="fr-FR" smtClean="0"/>
+              <a:rPr lang="fr-FR"/>
               <a:t>Modifiez les styles du texte du masque</a:t>
             </a:r>
           </a:p>
           <a:p>
             <a:pPr lvl="1"/>
             <a:r>
-              <a:rPr lang="fr-FR" smtClean="0"/>
+              <a:rPr lang="fr-FR"/>
               <a:t>Deuxième niveau</a:t>
             </a:r>
           </a:p>
           <a:p>
             <a:pPr lvl="2"/>
             <a:r>
-              <a:rPr lang="fr-FR" smtClean="0"/>
+              <a:rPr lang="fr-FR"/>
               <a:t>Troisième niveau</a:t>
             </a:r>
           </a:p>
           <a:p>
             <a:pPr lvl="3"/>
             <a:r>
-              <a:rPr lang="fr-FR" smtClean="0"/>
+              <a:rPr lang="fr-FR"/>
               <a:t>Quatrième niveau</a:t>
             </a:r>
           </a:p>
           <a:p>
             <a:pPr lvl="4"/>
             <a:r>
-              <a:rPr lang="fr-FR" smtClean="0"/>
+              <a:rPr lang="fr-FR"/>
               <a:t>Cinquième niveau</a:t>
             </a:r>
-            <a:endParaRPr lang="fr-FR"/>
           </a:p>
         </p:txBody>
       </p:sp>
@@ -3099,7 +3093,7 @@
             <a:fld id="{CEE667AA-1165-4D19-A520-0AAEBAFEBFEE}" type="datetimeFigureOut">
               <a:rPr lang="fr-FR" smtClean="0"/>
               <a:pPr/>
-              <a:t>05/01/2015</a:t>
+              <a:t>07/11/2023</a:t>
             </a:fld>
             <a:endParaRPr lang="fr-FR"/>
           </a:p>
@@ -3736,7 +3730,7 @@
                             <m:chr m:val="⃗"/>
                             <m:ctrlPr>
                               <a:rPr lang="fr-FR" sz="1400" i="1" smtClean="0">
-                                <a:latin typeface="Cambria Math"/>
+                                <a:latin typeface="Cambria Math" panose="02040503050406030204" pitchFamily="18" charset="0"/>
                               </a:rPr>
                             </m:ctrlPr>
                           </m:accPr>
@@ -3745,7 +3739,7 @@
                               <m:sSubPr>
                                 <m:ctrlPr>
                                   <a:rPr lang="fr-FR" sz="1400" b="0" i="1" smtClean="0">
-                                    <a:latin typeface="Cambria Math"/>
+                                    <a:latin typeface="Cambria Math" panose="02040503050406030204" pitchFamily="18" charset="0"/>
                                   </a:rPr>
                                 </m:ctrlPr>
                               </m:sSubPr>
@@ -3851,7 +3845,7 @@
                             <m:chr m:val="⃗"/>
                             <m:ctrlPr>
                               <a:rPr lang="fr-FR" sz="1400" i="1" smtClean="0">
-                                <a:latin typeface="Cambria Math"/>
+                                <a:latin typeface="Cambria Math" panose="02040503050406030204" pitchFamily="18" charset="0"/>
                               </a:rPr>
                             </m:ctrlPr>
                           </m:accPr>
@@ -3860,7 +3854,7 @@
                               <m:sSubPr>
                                 <m:ctrlPr>
                                   <a:rPr lang="fr-FR" sz="1400" b="0" i="1" smtClean="0">
-                                    <a:latin typeface="Cambria Math"/>
+                                    <a:latin typeface="Cambria Math" panose="02040503050406030204" pitchFamily="18" charset="0"/>
                                   </a:rPr>
                                 </m:ctrlPr>
                               </m:sSubPr>
@@ -3966,7 +3960,7 @@
                             <m:chr m:val="⃗"/>
                             <m:ctrlPr>
                               <a:rPr lang="fr-FR" sz="1400" i="1" smtClean="0">
-                                <a:latin typeface="Cambria Math"/>
+                                <a:latin typeface="Cambria Math" panose="02040503050406030204" pitchFamily="18" charset="0"/>
                               </a:rPr>
                             </m:ctrlPr>
                           </m:accPr>
@@ -3975,7 +3969,7 @@
                               <m:sSubPr>
                                 <m:ctrlPr>
                                   <a:rPr lang="fr-FR" sz="1400" b="0" i="1" smtClean="0">
-                                    <a:latin typeface="Cambria Math"/>
+                                    <a:latin typeface="Cambria Math" panose="02040503050406030204" pitchFamily="18" charset="0"/>
                                   </a:rPr>
                                 </m:ctrlPr>
                               </m:sSubPr>
@@ -4081,7 +4075,7 @@
                             <m:chr m:val="⃗"/>
                             <m:ctrlPr>
                               <a:rPr lang="fr-FR" sz="1400" i="1" smtClean="0">
-                                <a:latin typeface="Cambria Math"/>
+                                <a:latin typeface="Cambria Math" panose="02040503050406030204" pitchFamily="18" charset="0"/>
                               </a:rPr>
                             </m:ctrlPr>
                           </m:accPr>
@@ -4090,7 +4084,7 @@
                               <m:sSubPr>
                                 <m:ctrlPr>
                                   <a:rPr lang="fr-FR" sz="1400" b="0" i="1" smtClean="0">
-                                    <a:latin typeface="Cambria Math"/>
+                                    <a:latin typeface="Cambria Math" panose="02040503050406030204" pitchFamily="18" charset="0"/>
                                   </a:rPr>
                                 </m:ctrlPr>
                               </m:sSubPr>
@@ -4196,7 +4190,7 @@
                             <m:chr m:val="⃗"/>
                             <m:ctrlPr>
                               <a:rPr lang="fr-FR" sz="1400" i="1" smtClean="0">
-                                <a:latin typeface="Cambria Math"/>
+                                <a:latin typeface="Cambria Math" panose="02040503050406030204" pitchFamily="18" charset="0"/>
                               </a:rPr>
                             </m:ctrlPr>
                           </m:accPr>
@@ -4205,7 +4199,7 @@
                               <m:sSubPr>
                                 <m:ctrlPr>
                                   <a:rPr lang="fr-FR" sz="1400" b="0" i="1" smtClean="0">
-                                    <a:latin typeface="Cambria Math"/>
+                                    <a:latin typeface="Cambria Math" panose="02040503050406030204" pitchFamily="18" charset="0"/>
                                   </a:rPr>
                                 </m:ctrlPr>
                               </m:sSubPr>
@@ -4635,7 +4629,7 @@
                             <m:chr m:val="⃗"/>
                             <m:ctrlPr>
                               <a:rPr lang="fr-FR" sz="1400" i="1" smtClean="0">
-                                <a:latin typeface="Cambria Math"/>
+                                <a:latin typeface="Cambria Math" panose="02040503050406030204" pitchFamily="18" charset="0"/>
                               </a:rPr>
                             </m:ctrlPr>
                           </m:accPr>
@@ -4644,7 +4638,7 @@
                               <m:sSubPr>
                                 <m:ctrlPr>
                                   <a:rPr lang="fr-FR" sz="1400" b="0" i="1" smtClean="0">
-                                    <a:latin typeface="Cambria Math"/>
+                                    <a:latin typeface="Cambria Math" panose="02040503050406030204" pitchFamily="18" charset="0"/>
                                   </a:rPr>
                                 </m:ctrlPr>
                               </m:sSubPr>
@@ -4750,7 +4744,7 @@
                             <m:chr m:val="⃗"/>
                             <m:ctrlPr>
                               <a:rPr lang="fr-FR" sz="1400" i="1" smtClean="0">
-                                <a:latin typeface="Cambria Math"/>
+                                <a:latin typeface="Cambria Math" panose="02040503050406030204" pitchFamily="18" charset="0"/>
                               </a:rPr>
                             </m:ctrlPr>
                           </m:accPr>
@@ -4759,7 +4753,7 @@
                               <m:sSubPr>
                                 <m:ctrlPr>
                                   <a:rPr lang="fr-FR" sz="1400" b="0" i="1" smtClean="0">
-                                    <a:latin typeface="Cambria Math"/>
+                                    <a:latin typeface="Cambria Math" panose="02040503050406030204" pitchFamily="18" charset="0"/>
                                   </a:rPr>
                                 </m:ctrlPr>
                               </m:sSubPr>
@@ -4865,7 +4859,7 @@
                             <m:chr m:val="⃗"/>
                             <m:ctrlPr>
                               <a:rPr lang="fr-FR" sz="1400" i="1" smtClean="0">
-                                <a:latin typeface="Cambria Math"/>
+                                <a:latin typeface="Cambria Math" panose="02040503050406030204" pitchFamily="18" charset="0"/>
                               </a:rPr>
                             </m:ctrlPr>
                           </m:accPr>
@@ -4874,7 +4868,7 @@
                               <m:sSubPr>
                                 <m:ctrlPr>
                                   <a:rPr lang="fr-FR" sz="1400" b="0" i="1" smtClean="0">
-                                    <a:latin typeface="Cambria Math"/>
+                                    <a:latin typeface="Cambria Math" panose="02040503050406030204" pitchFamily="18" charset="0"/>
                                   </a:rPr>
                                 </m:ctrlPr>
                               </m:sSubPr>
@@ -4980,7 +4974,7 @@
                             <m:chr m:val="⃗"/>
                             <m:ctrlPr>
                               <a:rPr lang="fr-FR" sz="1400" i="1" smtClean="0">
-                                <a:latin typeface="Cambria Math"/>
+                                <a:latin typeface="Cambria Math" panose="02040503050406030204" pitchFamily="18" charset="0"/>
                               </a:rPr>
                             </m:ctrlPr>
                           </m:accPr>
@@ -4989,7 +4983,7 @@
                               <m:sSubPr>
                                 <m:ctrlPr>
                                   <a:rPr lang="fr-FR" sz="1400" b="0" i="1" smtClean="0">
-                                    <a:latin typeface="Cambria Math"/>
+                                    <a:latin typeface="Cambria Math" panose="02040503050406030204" pitchFamily="18" charset="0"/>
                                   </a:rPr>
                                 </m:ctrlPr>
                               </m:sSubPr>
@@ -5095,7 +5089,7 @@
                             <m:chr m:val="⃗"/>
                             <m:ctrlPr>
                               <a:rPr lang="fr-FR" sz="1400" i="1" smtClean="0">
-                                <a:latin typeface="Cambria Math"/>
+                                <a:latin typeface="Cambria Math" panose="02040503050406030204" pitchFamily="18" charset="0"/>
                               </a:rPr>
                             </m:ctrlPr>
                           </m:accPr>
@@ -5104,7 +5098,7 @@
                               <m:sSubPr>
                                 <m:ctrlPr>
                                   <a:rPr lang="fr-FR" sz="1400" b="0" i="1" smtClean="0">
-                                    <a:latin typeface="Cambria Math"/>
+                                    <a:latin typeface="Cambria Math" panose="02040503050406030204" pitchFamily="18" charset="0"/>
                                   </a:rPr>
                                 </m:ctrlPr>
                               </m:sSubPr>
@@ -5714,8 +5708,8 @@
           </p:style>
         </p:cxnSp>
       </p:grpSp>
-      <mc:AlternateContent xmlns:mc="http://schemas.openxmlformats.org/markup-compatibility/2006" xmlns:a14="http://schemas.microsoft.com/office/drawing/2010/main">
-        <mc:Choice Requires="a14">
+      <mc:AlternateContent xmlns:mc="http://schemas.openxmlformats.org/markup-compatibility/2006">
+        <mc:Choice xmlns:a14="http://schemas.microsoft.com/office/drawing/2010/main" Requires="a14">
           <p:sp>
             <p:nvSpPr>
               <p:cNvPr id="9" name="ZoneTexte 8"/>
@@ -5725,6 +5719,121 @@
             <p:spPr>
               <a:xfrm>
                 <a:off x="2223959" y="3141184"/>
+                <a:ext cx="340157" cy="298159"/>
+              </a:xfrm>
+              <a:prstGeom prst="rect">
+                <a:avLst/>
+              </a:prstGeom>
+              <a:noFill/>
+            </p:spPr>
+            <p:txBody>
+              <a:bodyPr wrap="none" rtlCol="0">
+                <a:spAutoFit/>
+              </a:bodyPr>
+              <a:lstStyle/>
+              <a:p>
+                <a:pPr/>
+                <a14:m>
+                  <m:oMathPara xmlns:m="http://schemas.openxmlformats.org/officeDocument/2006/math">
+                    <m:oMathParaPr>
+                      <m:jc m:val="centerGroup"/>
+                    </m:oMathParaPr>
+                    <m:oMath xmlns:m="http://schemas.openxmlformats.org/officeDocument/2006/math">
+                      <m:acc>
+                        <m:accPr>
+                          <m:chr m:val="⃗"/>
+                          <m:ctrlPr>
+                            <a:rPr lang="fr-FR" sz="1200" i="1" smtClean="0">
+                              <a:latin typeface="Cambria Math" panose="02040503050406030204" pitchFamily="18" charset="0"/>
+                            </a:rPr>
+                          </m:ctrlPr>
+                        </m:accPr>
+                        <m:e>
+                          <m:sSub>
+                            <m:sSubPr>
+                              <m:ctrlPr>
+                                <a:rPr lang="fr-FR" sz="1200" b="0" i="1" smtClean="0">
+                                  <a:latin typeface="Cambria Math" panose="02040503050406030204" pitchFamily="18" charset="0"/>
+                                </a:rPr>
+                              </m:ctrlPr>
+                            </m:sSubPr>
+                            <m:e>
+                              <m:r>
+                                <a:rPr lang="fr-FR" sz="1200" b="0" i="1" smtClean="0">
+                                  <a:latin typeface="Cambria Math" panose="02040503050406030204" pitchFamily="18" charset="0"/>
+                                </a:rPr>
+                                <m:t>𝑖</m:t>
+                              </m:r>
+                            </m:e>
+                            <m:sub>
+                              <m:r>
+                                <a:rPr lang="fr-FR" sz="1200" b="0" i="1" smtClean="0">
+                                  <a:latin typeface="Cambria Math"/>
+                                </a:rPr>
+                                <m:t>0</m:t>
+                              </m:r>
+                            </m:sub>
+                          </m:sSub>
+                        </m:e>
+                      </m:acc>
+                    </m:oMath>
+                  </m:oMathPara>
+                </a14:m>
+                <a:endParaRPr lang="fr-FR" sz="1200" dirty="0"/>
+              </a:p>
+            </p:txBody>
+          </p:sp>
+        </mc:Choice>
+        <mc:Fallback>
+          <p:sp>
+            <p:nvSpPr>
+              <p:cNvPr id="9" name="ZoneTexte 8"/>
+              <p:cNvSpPr txBox="1">
+                <a:spLocks noRot="1" noChangeAspect="1" noMove="1" noResize="1" noEditPoints="1" noAdjustHandles="1" noChangeArrowheads="1" noChangeShapeType="1" noTextEdit="1"/>
+              </p:cNvSpPr>
+              <p:nvPr/>
+            </p:nvSpPr>
+            <p:spPr>
+              <a:xfrm>
+                <a:off x="2223959" y="3141184"/>
+                <a:ext cx="340157" cy="298159"/>
+              </a:xfrm>
+              <a:prstGeom prst="rect">
+                <a:avLst/>
+              </a:prstGeom>
+              <a:blipFill>
+                <a:blip r:embed="rId2"/>
+                <a:stretch>
+                  <a:fillRect/>
+                </a:stretch>
+              </a:blipFill>
+            </p:spPr>
+            <p:txBody>
+              <a:bodyPr/>
+              <a:lstStyle/>
+              <a:p>
+                <a:r>
+                  <a:rPr lang="fr-FR">
+                    <a:noFill/>
+                  </a:rPr>
+                  <a:t> </a:t>
+                </a:r>
+              </a:p>
+            </p:txBody>
+          </p:sp>
+        </mc:Fallback>
+      </mc:AlternateContent>
+      <mc:AlternateContent xmlns:mc="http://schemas.openxmlformats.org/markup-compatibility/2006">
+        <mc:Choice xmlns:a14="http://schemas.microsoft.com/office/drawing/2010/main" Requires="a14">
+          <p:sp>
+            <p:nvSpPr>
+              <p:cNvPr id="10" name="ZoneTexte 9"/>
+              <p:cNvSpPr txBox="1"/>
+              <p:nvPr/>
+            </p:nvSpPr>
+            <p:spPr>
+              <a:xfrm>
+                <a:off x="3881385" y="3279683"/>
                 <a:ext cx="342914" cy="298159"/>
               </a:xfrm>
               <a:prstGeom prst="rect">
@@ -5750,7 +5859,7 @@
                           <m:chr m:val="⃗"/>
                           <m:ctrlPr>
                             <a:rPr lang="fr-FR" sz="1200" i="1" smtClean="0">
-                              <a:latin typeface="Cambria Math"/>
+                              <a:latin typeface="Cambria Math" panose="02040503050406030204" pitchFamily="18" charset="0"/>
                             </a:rPr>
                           </m:ctrlPr>
                         </m:accPr>
@@ -5759,131 +5868,16 @@
                             <m:sSubPr>
                               <m:ctrlPr>
                                 <a:rPr lang="fr-FR" sz="1200" b="0" i="1" smtClean="0">
-                                  <a:latin typeface="Cambria Math"/>
+                                  <a:latin typeface="Cambria Math" panose="02040503050406030204" pitchFamily="18" charset="0"/>
                                 </a:rPr>
                               </m:ctrlPr>
                             </m:sSubPr>
                             <m:e>
                               <m:r>
                                 <a:rPr lang="fr-FR" sz="1200" b="0" i="1" smtClean="0">
-                                  <a:latin typeface="Cambria Math"/>
+                                  <a:latin typeface="Cambria Math" panose="02040503050406030204" pitchFamily="18" charset="0"/>
                                 </a:rPr>
                                 <m:t>𝑗</m:t>
-                              </m:r>
-                            </m:e>
-                            <m:sub>
-                              <m:r>
-                                <a:rPr lang="fr-FR" sz="1200" b="0" i="1" smtClean="0">
-                                  <a:latin typeface="Cambria Math"/>
-                                </a:rPr>
-                                <m:t>0</m:t>
-                              </m:r>
-                            </m:sub>
-                          </m:sSub>
-                        </m:e>
-                      </m:acc>
-                    </m:oMath>
-                  </m:oMathPara>
-                </a14:m>
-                <a:endParaRPr lang="fr-FR" sz="1200" dirty="0"/>
-              </a:p>
-            </p:txBody>
-          </p:sp>
-        </mc:Choice>
-        <mc:Fallback xmlns="">
-          <p:sp>
-            <p:nvSpPr>
-              <p:cNvPr id="9" name="ZoneTexte 8"/>
-              <p:cNvSpPr txBox="1">
-                <a:spLocks noRot="1" noChangeAspect="1" noMove="1" noResize="1" noEditPoints="1" noAdjustHandles="1" noChangeArrowheads="1" noChangeShapeType="1" noTextEdit="1"/>
-              </p:cNvSpPr>
-              <p:nvPr/>
-            </p:nvSpPr>
-            <p:spPr>
-              <a:xfrm>
-                <a:off x="2223959" y="3141184"/>
-                <a:ext cx="342914" cy="298159"/>
-              </a:xfrm>
-              <a:prstGeom prst="rect">
-                <a:avLst/>
-              </a:prstGeom>
-              <a:blipFill rotWithShape="1">
-                <a:blip r:embed="rId2"/>
-                <a:stretch>
-                  <a:fillRect b="-2041"/>
-                </a:stretch>
-              </a:blipFill>
-            </p:spPr>
-            <p:txBody>
-              <a:bodyPr/>
-              <a:lstStyle/>
-              <a:p>
-                <a:r>
-                  <a:rPr lang="fr-FR">
-                    <a:noFill/>
-                  </a:rPr>
-                  <a:t> </a:t>
-                </a:r>
-              </a:p>
-            </p:txBody>
-          </p:sp>
-        </mc:Fallback>
-      </mc:AlternateContent>
-      <mc:AlternateContent xmlns:mc="http://schemas.openxmlformats.org/markup-compatibility/2006" xmlns:a14="http://schemas.microsoft.com/office/drawing/2010/main">
-        <mc:Choice Requires="a14">
-          <p:sp>
-            <p:nvSpPr>
-              <p:cNvPr id="10" name="ZoneTexte 9"/>
-              <p:cNvSpPr txBox="1"/>
-              <p:nvPr/>
-            </p:nvSpPr>
-            <p:spPr>
-              <a:xfrm>
-                <a:off x="3881385" y="3279683"/>
-                <a:ext cx="340157" cy="298159"/>
-              </a:xfrm>
-              <a:prstGeom prst="rect">
-                <a:avLst/>
-              </a:prstGeom>
-              <a:noFill/>
-            </p:spPr>
-            <p:txBody>
-              <a:bodyPr wrap="none" rtlCol="0">
-                <a:spAutoFit/>
-              </a:bodyPr>
-              <a:lstStyle/>
-              <a:p>
-                <a:pPr/>
-                <a14:m>
-                  <m:oMathPara xmlns:m="http://schemas.openxmlformats.org/officeDocument/2006/math">
-                    <m:oMathParaPr>
-                      <m:jc m:val="centerGroup"/>
-                    </m:oMathParaPr>
-                    <m:oMath xmlns:m="http://schemas.openxmlformats.org/officeDocument/2006/math">
-                      <m:acc>
-                        <m:accPr>
-                          <m:chr m:val="⃗"/>
-                          <m:ctrlPr>
-                            <a:rPr lang="fr-FR" sz="1200" i="1" smtClean="0">
-                              <a:latin typeface="Cambria Math"/>
-                            </a:rPr>
-                          </m:ctrlPr>
-                        </m:accPr>
-                        <m:e>
-                          <m:sSub>
-                            <m:sSubPr>
-                              <m:ctrlPr>
-                                <a:rPr lang="fr-FR" sz="1200" b="0" i="1" smtClean="0">
-                                  <a:latin typeface="Cambria Math"/>
-                                </a:rPr>
-                              </m:ctrlPr>
-                            </m:sSubPr>
-                            <m:e>
-                              <m:r>
-                                <a:rPr lang="fr-FR" sz="1200" b="0" i="1" smtClean="0">
-                                  <a:latin typeface="Cambria Math"/>
-                                </a:rPr>
-                                <m:t>𝑖</m:t>
                               </m:r>
                             </m:e>
                             <m:sub>
@@ -5905,7 +5899,7 @@
             </p:txBody>
           </p:sp>
         </mc:Choice>
-        <mc:Fallback xmlns="">
+        <mc:Fallback>
           <p:sp>
             <p:nvSpPr>
               <p:cNvPr id="10" name="ZoneTexte 9"/>
@@ -5917,15 +5911,15 @@
             <p:spPr>
               <a:xfrm>
                 <a:off x="3881385" y="3279683"/>
-                <a:ext cx="340157" cy="298159"/>
+                <a:ext cx="342914" cy="298159"/>
               </a:xfrm>
               <a:prstGeom prst="rect">
                 <a:avLst/>
               </a:prstGeom>
-              <a:blipFill rotWithShape="1">
+              <a:blipFill>
                 <a:blip r:embed="rId3"/>
                 <a:stretch>
-                  <a:fillRect/>
+                  <a:fillRect b="-4082"/>
                 </a:stretch>
               </a:blipFill>
             </p:spPr>
@@ -5968,7 +5962,7 @@
           <a:p>
             <a:pPr algn="ctr"/>
             <a:r>
-              <a:rPr lang="fr-FR" sz="1050" dirty="0" smtClean="0">
+              <a:rPr lang="fr-FR" sz="1050" dirty="0">
                 <a:solidFill>
                   <a:schemeClr val="bg1">
                     <a:lumMod val="50000"/>
@@ -6437,7 +6431,7 @@
                         <m:sSubPr>
                           <m:ctrlPr>
                             <a:rPr lang="fr-FR" sz="1200" b="0" i="1" smtClean="0">
-                              <a:latin typeface="Cambria Math"/>
+                              <a:latin typeface="Cambria Math" panose="02040503050406030204" pitchFamily="18" charset="0"/>
                             </a:rPr>
                           </m:ctrlPr>
                         </m:sSubPr>
@@ -6541,7 +6535,7 @@
                           <m:chr m:val="⃗"/>
                           <m:ctrlPr>
                             <a:rPr lang="fr-FR" sz="1200" i="1" smtClean="0">
-                              <a:latin typeface="Cambria Math"/>
+                              <a:latin typeface="Cambria Math" panose="02040503050406030204" pitchFamily="18" charset="0"/>
                             </a:rPr>
                           </m:ctrlPr>
                         </m:accPr>
@@ -6550,7 +6544,7 @@
                             <m:sSubPr>
                               <m:ctrlPr>
                                 <a:rPr lang="fr-FR" sz="1200" b="0" i="1" smtClean="0">
-                                  <a:latin typeface="Cambria Math"/>
+                                  <a:latin typeface="Cambria Math" panose="02040503050406030204" pitchFamily="18" charset="0"/>
                                 </a:rPr>
                               </m:ctrlPr>
                             </m:sSubPr>
@@ -6692,7 +6686,7 @@
                           <m:chr m:val="⃗"/>
                           <m:ctrlPr>
                             <a:rPr lang="fr-FR" sz="1200" i="1" smtClean="0">
-                              <a:latin typeface="Cambria Math"/>
+                              <a:latin typeface="Cambria Math" panose="02040503050406030204" pitchFamily="18" charset="0"/>
                             </a:rPr>
                           </m:ctrlPr>
                         </m:accPr>
@@ -6701,7 +6695,7 @@
                             <m:sSubPr>
                               <m:ctrlPr>
                                 <a:rPr lang="fr-FR" sz="1200" b="0" i="1" smtClean="0">
-                                  <a:latin typeface="Cambria Math"/>
+                                  <a:latin typeface="Cambria Math" panose="02040503050406030204" pitchFamily="18" charset="0"/>
                                 </a:rPr>
                               </m:ctrlPr>
                             </m:sSubPr>
@@ -7396,7 +7390,7 @@
                           <m:chr m:val="⃗"/>
                           <m:ctrlPr>
                             <a:rPr lang="fr-FR" sz="1200" i="1" smtClean="0">
-                              <a:latin typeface="Cambria Math"/>
+                              <a:latin typeface="Cambria Math" panose="02040503050406030204" pitchFamily="18" charset="0"/>
                             </a:rPr>
                           </m:ctrlPr>
                         </m:accPr>
@@ -7405,7 +7399,7 @@
                             <m:sSubPr>
                               <m:ctrlPr>
                                 <a:rPr lang="fr-FR" sz="1200" b="0" i="1" smtClean="0">
-                                  <a:latin typeface="Cambria Math"/>
+                                  <a:latin typeface="Cambria Math" panose="02040503050406030204" pitchFamily="18" charset="0"/>
                                 </a:rPr>
                               </m:ctrlPr>
                             </m:sSubPr>
@@ -7499,7 +7493,7 @@
           <a:p>
             <a:pPr algn="ctr"/>
             <a:r>
-              <a:rPr lang="fr-FR" sz="1050" dirty="0" smtClean="0">
+              <a:rPr lang="fr-FR" sz="1050" dirty="0">
                 <a:solidFill>
                   <a:srgbClr val="0070C0"/>
                 </a:solidFill>
@@ -7538,7 +7532,7 @@
           <a:p>
             <a:pPr algn="ctr"/>
             <a:r>
-              <a:rPr lang="fr-FR" sz="1050" dirty="0" smtClean="0">
+              <a:rPr lang="fr-FR" sz="1050" dirty="0">
                 <a:solidFill>
                   <a:srgbClr val="00B050"/>
                 </a:solidFill>
@@ -7588,7 +7582,7 @@
                         <m:sSubPr>
                           <m:ctrlPr>
                             <a:rPr lang="fr-FR" sz="1200" b="0" i="1" smtClean="0">
-                              <a:latin typeface="Cambria Math"/>
+                              <a:latin typeface="Cambria Math" panose="02040503050406030204" pitchFamily="18" charset="0"/>
                             </a:rPr>
                           </m:ctrlPr>
                         </m:sSubPr>

</xml_diff>